<commit_message>
updating powerpoint with nutrition info
</commit_message>
<xml_diff>
--- a/Documentation/CodeCrunchers.pptx
+++ b/Documentation/CodeCrunchers.pptx
@@ -8,7 +8,7 @@
     <p:sldId id="256" r:id="rId2"/>
     <p:sldId id="257" r:id="rId3"/>
     <p:sldId id="258" r:id="rId4"/>
-    <p:sldId id="259" r:id="rId5"/>
+    <p:sldId id="262" r:id="rId5"/>
     <p:sldId id="260" r:id="rId6"/>
     <p:sldId id="261" r:id="rId7"/>
   </p:sldIdLst>
@@ -496,6 +496,7 @@
           <a:p>
             <a:fld id="{728B3BC7-CA78-4193-B433-93D914FFC2C7}" type="datetimeFigureOut">
               <a:rPr lang="en-US" smtClean="0"/>
+              <a:pPr/>
               <a:t>4/16/2017</a:t>
             </a:fld>
             <a:endParaRPr lang="en-US"/>
@@ -538,6 +539,7 @@
           <a:p>
             <a:fld id="{AE4061D8-A58F-4575-87D2-810901833F8F}" type="slidenum">
               <a:rPr lang="en-US" smtClean="0"/>
+              <a:pPr/>
               <a:t>‹#›</a:t>
             </a:fld>
             <a:endParaRPr lang="en-US"/>
@@ -661,6 +663,7 @@
           <a:p>
             <a:fld id="{728B3BC7-CA78-4193-B433-93D914FFC2C7}" type="datetimeFigureOut">
               <a:rPr lang="en-US" smtClean="0"/>
+              <a:pPr/>
               <a:t>4/16/2017</a:t>
             </a:fld>
             <a:endParaRPr lang="en-US"/>
@@ -703,6 +706,7 @@
           <a:p>
             <a:fld id="{AE4061D8-A58F-4575-87D2-810901833F8F}" type="slidenum">
               <a:rPr lang="en-US" smtClean="0"/>
+              <a:pPr/>
               <a:t>‹#›</a:t>
             </a:fld>
             <a:endParaRPr lang="en-US"/>
@@ -836,6 +840,7 @@
           <a:p>
             <a:fld id="{728B3BC7-CA78-4193-B433-93D914FFC2C7}" type="datetimeFigureOut">
               <a:rPr lang="en-US" smtClean="0"/>
+              <a:pPr/>
               <a:t>4/16/2017</a:t>
             </a:fld>
             <a:endParaRPr lang="en-US"/>
@@ -878,6 +883,7 @@
           <a:p>
             <a:fld id="{AE4061D8-A58F-4575-87D2-810901833F8F}" type="slidenum">
               <a:rPr lang="en-US" smtClean="0"/>
+              <a:pPr/>
               <a:t>‹#›</a:t>
             </a:fld>
             <a:endParaRPr lang="en-US"/>
@@ -1005,6 +1011,7 @@
           <a:p>
             <a:fld id="{728B3BC7-CA78-4193-B433-93D914FFC2C7}" type="datetimeFigureOut">
               <a:rPr lang="en-US" smtClean="0"/>
+              <a:pPr/>
               <a:t>4/16/2017</a:t>
             </a:fld>
             <a:endParaRPr lang="en-US"/>
@@ -1047,6 +1054,7 @@
           <a:p>
             <a:fld id="{AE4061D8-A58F-4575-87D2-810901833F8F}" type="slidenum">
               <a:rPr lang="en-US" smtClean="0"/>
+              <a:pPr/>
               <a:t>‹#›</a:t>
             </a:fld>
             <a:endParaRPr lang="en-US"/>
@@ -1460,6 +1468,7 @@
           <a:p>
             <a:fld id="{728B3BC7-CA78-4193-B433-93D914FFC2C7}" type="datetimeFigureOut">
               <a:rPr lang="en-US" smtClean="0"/>
+              <a:pPr/>
               <a:t>4/16/2017</a:t>
             </a:fld>
             <a:endParaRPr lang="en-US"/>
@@ -1502,6 +1511,7 @@
           <a:p>
             <a:fld id="{AE4061D8-A58F-4575-87D2-810901833F8F}" type="slidenum">
               <a:rPr lang="en-US" smtClean="0"/>
+              <a:pPr/>
               <a:t>‹#›</a:t>
             </a:fld>
             <a:endParaRPr lang="en-US"/>
@@ -1724,6 +1734,7 @@
           <a:p>
             <a:fld id="{728B3BC7-CA78-4193-B433-93D914FFC2C7}" type="datetimeFigureOut">
               <a:rPr lang="en-US" smtClean="0"/>
+              <a:pPr/>
               <a:t>4/16/2017</a:t>
             </a:fld>
             <a:endParaRPr lang="en-US"/>
@@ -1766,6 +1777,7 @@
           <a:p>
             <a:fld id="{AE4061D8-A58F-4575-87D2-810901833F8F}" type="slidenum">
               <a:rPr lang="en-US" smtClean="0"/>
+              <a:pPr/>
               <a:t>‹#›</a:t>
             </a:fld>
             <a:endParaRPr lang="en-US"/>
@@ -2098,6 +2110,7 @@
           <a:p>
             <a:fld id="{728B3BC7-CA78-4193-B433-93D914FFC2C7}" type="datetimeFigureOut">
               <a:rPr lang="en-US" smtClean="0"/>
+              <a:pPr/>
               <a:t>4/16/2017</a:t>
             </a:fld>
             <a:endParaRPr lang="en-US"/>
@@ -2140,6 +2153,7 @@
           <a:p>
             <a:fld id="{AE4061D8-A58F-4575-87D2-810901833F8F}" type="slidenum">
               <a:rPr lang="en-US" smtClean="0"/>
+              <a:pPr/>
               <a:t>‹#›</a:t>
             </a:fld>
             <a:endParaRPr lang="en-US"/>
@@ -2220,6 +2234,7 @@
           <a:p>
             <a:fld id="{728B3BC7-CA78-4193-B433-93D914FFC2C7}" type="datetimeFigureOut">
               <a:rPr lang="en-US" smtClean="0"/>
+              <a:pPr/>
               <a:t>4/16/2017</a:t>
             </a:fld>
             <a:endParaRPr lang="en-US"/>
@@ -2243,6 +2258,7 @@
           <a:p>
             <a:fld id="{AE4061D8-A58F-4575-87D2-810901833F8F}" type="slidenum">
               <a:rPr lang="en-US" smtClean="0"/>
+              <a:pPr/>
               <a:t>‹#›</a:t>
             </a:fld>
             <a:endParaRPr lang="en-US"/>
@@ -2310,6 +2326,7 @@
           <a:p>
             <a:fld id="{728B3BC7-CA78-4193-B433-93D914FFC2C7}" type="datetimeFigureOut">
               <a:rPr lang="en-US" smtClean="0"/>
+              <a:pPr/>
               <a:t>4/16/2017</a:t>
             </a:fld>
             <a:endParaRPr lang="en-US"/>
@@ -2352,6 +2369,7 @@
           <a:p>
             <a:fld id="{AE4061D8-A58F-4575-87D2-810901833F8F}" type="slidenum">
               <a:rPr lang="en-US" smtClean="0"/>
+              <a:pPr/>
               <a:t>‹#›</a:t>
             </a:fld>
             <a:endParaRPr lang="en-US"/>
@@ -2559,6 +2577,7 @@
           <a:p>
             <a:fld id="{728B3BC7-CA78-4193-B433-93D914FFC2C7}" type="datetimeFigureOut">
               <a:rPr lang="en-US" smtClean="0"/>
+              <a:pPr/>
               <a:t>4/16/2017</a:t>
             </a:fld>
             <a:endParaRPr lang="en-US"/>
@@ -2606,6 +2625,7 @@
           <a:p>
             <a:fld id="{AE4061D8-A58F-4575-87D2-810901833F8F}" type="slidenum">
               <a:rPr lang="en-US" smtClean="0"/>
+              <a:pPr/>
               <a:t>‹#›</a:t>
             </a:fld>
             <a:endParaRPr lang="en-US"/>
@@ -2818,6 +2838,7 @@
           <a:p>
             <a:fld id="{728B3BC7-CA78-4193-B433-93D914FFC2C7}" type="datetimeFigureOut">
               <a:rPr lang="en-US" smtClean="0"/>
+              <a:pPr/>
               <a:t>4/16/2017</a:t>
             </a:fld>
             <a:endParaRPr lang="en-US"/>
@@ -2860,6 +2881,7 @@
           <a:p>
             <a:fld id="{AE4061D8-A58F-4575-87D2-810901833F8F}" type="slidenum">
               <a:rPr lang="en-US" smtClean="0"/>
+              <a:pPr/>
               <a:t>‹#›</a:t>
             </a:fld>
             <a:endParaRPr lang="en-US"/>
@@ -3222,6 +3244,7 @@
           <a:p>
             <a:fld id="{728B3BC7-CA78-4193-B433-93D914FFC2C7}" type="datetimeFigureOut">
               <a:rPr lang="en-US" smtClean="0"/>
+              <a:pPr/>
               <a:t>4/16/2017</a:t>
             </a:fld>
             <a:endParaRPr lang="en-US"/>
@@ -3300,6 +3323,7 @@
           <a:p>
             <a:fld id="{AE4061D8-A58F-4575-87D2-810901833F8F}" type="slidenum">
               <a:rPr lang="en-US" smtClean="0"/>
+              <a:pPr/>
               <a:t>‹#›</a:t>
             </a:fld>
             <a:endParaRPr lang="en-US"/>
@@ -4007,7 +4031,12 @@
             <p:ph type="title"/>
           </p:nvPr>
         </p:nvSpPr>
-        <p:spPr/>
+        <p:spPr>
+          <a:xfrm>
+            <a:off x="381000" y="228600"/>
+            <a:ext cx="7467600" cy="1143000"/>
+          </a:xfrm>
+        </p:spPr>
         <p:txBody>
           <a:bodyPr>
             <a:normAutofit fontScale="90000"/>
@@ -4032,12 +4061,292 @@
             <p:ph idx="1"/>
           </p:nvPr>
         </p:nvSpPr>
-        <p:spPr/>
+        <p:spPr>
+          <a:xfrm>
+            <a:off x="152400" y="1219200"/>
+            <a:ext cx="8534400" cy="4648200"/>
+          </a:xfrm>
+        </p:spPr>
         <p:txBody>
           <a:bodyPr/>
           <a:lstStyle/>
           <a:p>
-            <a:endParaRPr lang="en-US"/>
+            <a:r>
+              <a:rPr lang="en-US" dirty="0" smtClean="0"/>
+              <a:t>Created 3 food categories (due to training time limitation): hamburger, salad, and sub (submarine sandwich)</a:t>
+            </a:r>
+          </a:p>
+          <a:p>
+            <a:r>
+              <a:rPr lang="en-US" dirty="0" smtClean="0"/>
+              <a:t>Used </a:t>
+            </a:r>
+            <a:r>
+              <a:rPr lang="en-US" dirty="0" err="1" smtClean="0"/>
+              <a:t>TensorFlow</a:t>
+            </a:r>
+            <a:r>
+              <a:rPr lang="en-US" dirty="0" smtClean="0"/>
+              <a:t> google inception model. Trained last layer and got the bottleneck data.</a:t>
+            </a:r>
+          </a:p>
+          <a:p>
+            <a:r>
+              <a:rPr lang="en-US" dirty="0" smtClean="0"/>
+              <a:t>Left picture: </a:t>
+            </a:r>
+            <a:r>
+              <a:rPr lang="en-US" dirty="0" err="1" smtClean="0"/>
+              <a:t>Tensorflow</a:t>
+            </a:r>
+            <a:r>
+              <a:rPr lang="en-US" dirty="0" smtClean="0"/>
+              <a:t> testing result with accuracy 98%. Right: testing image.</a:t>
+            </a:r>
+          </a:p>
+          <a:p>
+            <a:r>
+              <a:rPr lang="en-US" dirty="0" smtClean="0"/>
+              <a:t>Dataset: </a:t>
+            </a:r>
+            <a:r>
+              <a:rPr lang="en-US" dirty="0"/>
+              <a:t>Pittsburgh Fast-Food Image </a:t>
+            </a:r>
+            <a:r>
+              <a:rPr lang="en-US" dirty="0" smtClean="0"/>
+              <a:t>Dataset.</a:t>
+            </a:r>
+          </a:p>
+          <a:p>
+            <a:pPr marL="36576" indent="0">
+              <a:buNone/>
+            </a:pPr>
+            <a:endParaRPr lang="en-US" dirty="0"/>
+          </a:p>
+        </p:txBody>
+      </p:sp>
+      <p:pic>
+        <p:nvPicPr>
+          <p:cNvPr id="1026" name="Picture 2"/>
+          <p:cNvPicPr>
+            <a:picLocks noChangeAspect="1" noChangeArrowheads="1"/>
+          </p:cNvPicPr>
+          <p:nvPr/>
+        </p:nvPicPr>
+        <p:blipFill rotWithShape="1">
+          <a:blip r:embed="rId2" cstate="print">
+            <a:extLst>
+              <a:ext uri="{28A0092B-C50C-407E-A947-70E740481C1C}">
+                <a14:useLocalDpi xmlns:a14="http://schemas.microsoft.com/office/drawing/2010/main" xmlns="" val="0"/>
+              </a:ext>
+            </a:extLst>
+          </a:blip>
+          <a:srcRect l="16611" t="56398"/>
+          <a:stretch/>
+        </p:blipFill>
+        <p:spPr bwMode="auto">
+          <a:xfrm>
+            <a:off x="1447800" y="5528647"/>
+            <a:ext cx="2668793" cy="872153"/>
+          </a:xfrm>
+          <a:prstGeom prst="rect">
+            <a:avLst/>
+          </a:prstGeom>
+          <a:noFill/>
+          <a:ln>
+            <a:noFill/>
+          </a:ln>
+          <a:extLst>
+            <a:ext uri="{909E8E84-426E-40DD-AFC4-6F175D3DCCD1}">
+              <a14:hiddenFill xmlns:a14="http://schemas.microsoft.com/office/drawing/2010/main" xmlns="">
+                <a:solidFill>
+                  <a:schemeClr val="accent1"/>
+                </a:solidFill>
+              </a14:hiddenFill>
+            </a:ext>
+            <a:ext uri="{91240B29-F687-4F45-9708-019B960494DF}">
+              <a14:hiddenLine xmlns:a14="http://schemas.microsoft.com/office/drawing/2010/main" xmlns="" w="9525">
+                <a:solidFill>
+                  <a:schemeClr val="tx1"/>
+                </a:solidFill>
+                <a:miter lim="800000"/>
+                <a:headEnd/>
+                <a:tailEnd/>
+              </a14:hiddenLine>
+            </a:ext>
+          </a:extLst>
+        </p:spPr>
+      </p:pic>
+      <p:pic>
+        <p:nvPicPr>
+          <p:cNvPr id="1027" name="Picture 3"/>
+          <p:cNvPicPr>
+            <a:picLocks noChangeAspect="1" noChangeArrowheads="1"/>
+          </p:cNvPicPr>
+          <p:nvPr/>
+        </p:nvPicPr>
+        <p:blipFill>
+          <a:blip r:embed="rId3" cstate="print">
+            <a:extLst>
+              <a:ext uri="{28A0092B-C50C-407E-A947-70E740481C1C}">
+                <a14:useLocalDpi xmlns:a14="http://schemas.microsoft.com/office/drawing/2010/main" xmlns="" val="0"/>
+              </a:ext>
+            </a:extLst>
+          </a:blip>
+          <a:srcRect/>
+          <a:stretch>
+            <a:fillRect/>
+          </a:stretch>
+        </p:blipFill>
+        <p:spPr bwMode="auto">
+          <a:xfrm>
+            <a:off x="5257800" y="5400675"/>
+            <a:ext cx="1514475" cy="1152525"/>
+          </a:xfrm>
+          <a:prstGeom prst="rect">
+            <a:avLst/>
+          </a:prstGeom>
+          <a:noFill/>
+          <a:ln>
+            <a:noFill/>
+          </a:ln>
+          <a:extLst>
+            <a:ext uri="{909E8E84-426E-40DD-AFC4-6F175D3DCCD1}">
+              <a14:hiddenFill xmlns:a14="http://schemas.microsoft.com/office/drawing/2010/main" xmlns="">
+                <a:solidFill>
+                  <a:schemeClr val="accent1"/>
+                </a:solidFill>
+              </a14:hiddenFill>
+            </a:ext>
+            <a:ext uri="{91240B29-F687-4F45-9708-019B960494DF}">
+              <a14:hiddenLine xmlns:a14="http://schemas.microsoft.com/office/drawing/2010/main" xmlns="" w="9525">
+                <a:solidFill>
+                  <a:schemeClr val="tx1"/>
+                </a:solidFill>
+                <a:miter lim="800000"/>
+                <a:headEnd/>
+                <a:tailEnd/>
+              </a14:hiddenLine>
+            </a:ext>
+          </a:extLst>
+        </p:spPr>
+      </p:pic>
+      <p:sp>
+        <p:nvSpPr>
+          <p:cNvPr id="4" name="Rectangle 4"/>
+          <p:cNvSpPr>
+            <a:spLocks noChangeArrowheads="1"/>
+          </p:cNvSpPr>
+          <p:nvPr/>
+        </p:nvSpPr>
+        <p:spPr bwMode="auto">
+          <a:xfrm>
+            <a:off x="0" y="0"/>
+            <a:ext cx="9144000" cy="457200"/>
+          </a:xfrm>
+          <a:prstGeom prst="rect">
+            <a:avLst/>
+          </a:prstGeom>
+          <a:noFill/>
+          <a:ln>
+            <a:noFill/>
+          </a:ln>
+          <a:effectLst/>
+          <a:extLst>
+            <a:ext uri="{909E8E84-426E-40DD-AFC4-6F175D3DCCD1}">
+              <a14:hiddenFill xmlns:a14="http://schemas.microsoft.com/office/drawing/2010/main" xmlns="">
+                <a:solidFill>
+                  <a:schemeClr val="accent1"/>
+                </a:solidFill>
+              </a14:hiddenFill>
+            </a:ext>
+            <a:ext uri="{91240B29-F687-4F45-9708-019B960494DF}">
+              <a14:hiddenLine xmlns:a14="http://schemas.microsoft.com/office/drawing/2010/main" xmlns="" w="9525">
+                <a:solidFill>
+                  <a:schemeClr val="tx1"/>
+                </a:solidFill>
+                <a:miter lim="800000"/>
+                <a:headEnd/>
+                <a:tailEnd/>
+              </a14:hiddenLine>
+            </a:ext>
+            <a:ext uri="{AF507438-7753-43E0-B8FC-AC1667EBCBE1}">
+              <a14:hiddenEffects xmlns:a14="http://schemas.microsoft.com/office/drawing/2010/main" xmlns="">
+                <a:effectLst>
+                  <a:outerShdw dist="35921" dir="2700000" algn="ctr" rotWithShape="0">
+                    <a:schemeClr val="bg2"/>
+                  </a:outerShdw>
+                </a:effectLst>
+              </a14:hiddenEffects>
+            </a:ext>
+          </a:extLst>
+        </p:spPr>
+        <p:txBody>
+          <a:bodyPr vert="horz" wrap="none" lIns="91440" tIns="0" rIns="91440" bIns="0" numCol="1" anchor="ctr" anchorCtr="0" compatLnSpc="1">
+            <a:prstTxWarp prst="textNoShape">
+              <a:avLst/>
+            </a:prstTxWarp>
+            <a:spAutoFit/>
+          </a:bodyPr>
+          <a:lstStyle/>
+          <a:p>
+            <a:pPr marL="0" marR="0" lvl="0" indent="0" algn="l" defTabSz="914400" rtl="0" eaLnBrk="1" fontAlgn="base" latinLnBrk="0" hangingPunct="1">
+              <a:lnSpc>
+                <a:spcPct val="100000"/>
+              </a:lnSpc>
+              <a:spcBef>
+                <a:spcPct val="0"/>
+              </a:spcBef>
+              <a:spcAft>
+                <a:spcPct val="0"/>
+              </a:spcAft>
+              <a:buClrTx/>
+              <a:buSzTx/>
+              <a:buFontTx/>
+              <a:buNone/>
+              <a:tabLst/>
+            </a:pPr>
+            <a:r>
+              <a:rPr kumimoji="0" lang="en-US" altLang="en-US" sz="1100" b="0" i="0" u="none" strike="noStrike" cap="none" normalizeH="0" baseline="0" smtClean="0">
+                <a:ln>
+                  <a:noFill/>
+                </a:ln>
+                <a:solidFill>
+                  <a:srgbClr val="24292E"/>
+                </a:solidFill>
+                <a:effectLst/>
+                <a:latin typeface="Arial Unicode MS" pitchFamily="34" charset="-122"/>
+                <a:ea typeface="SFMono-Regular"/>
+                <a:cs typeface="Arial" pitchFamily="34" charset="0"/>
+              </a:rPr>
+              <a:t>Pittsburgh Fast-Food Image Dataset</a:t>
+            </a:r>
+            <a:r>
+              <a:rPr kumimoji="0" lang="en-US" altLang="en-US" sz="700" b="0" i="0" u="none" strike="noStrike" cap="none" normalizeH="0" baseline="0" smtClean="0">
+                <a:ln>
+                  <a:noFill/>
+                </a:ln>
+                <a:solidFill>
+                  <a:schemeClr val="tx1"/>
+                </a:solidFill>
+                <a:effectLst/>
+                <a:latin typeface="Arial" pitchFamily="34" charset="0"/>
+                <a:cs typeface="Arial" pitchFamily="34" charset="0"/>
+              </a:rPr>
+              <a:t> </a:t>
+            </a:r>
+            <a:endParaRPr kumimoji="0" lang="en-US" altLang="en-US" sz="1800" b="0" i="0" u="none" strike="noStrike" cap="none" normalizeH="0" baseline="0" smtClean="0">
+              <a:ln>
+                <a:noFill/>
+              </a:ln>
+              <a:solidFill>
+                <a:schemeClr val="tx1"/>
+              </a:solidFill>
+              <a:effectLst/>
+              <a:latin typeface="Arial" pitchFamily="34" charset="0"/>
+              <a:cs typeface="Arial" pitchFamily="34" charset="0"/>
+            </a:endParaRPr>
           </a:p>
         </p:txBody>
       </p:sp>
@@ -4076,37 +4385,173 @@
             <p:ph type="title"/>
           </p:nvPr>
         </p:nvSpPr>
-        <p:spPr/>
+        <p:spPr>
+          <a:xfrm>
+            <a:off x="457200" y="274638"/>
+            <a:ext cx="7467600" cy="944562"/>
+          </a:xfrm>
+        </p:spPr>
         <p:txBody>
           <a:bodyPr>
-            <a:normAutofit fontScale="90000"/>
+            <a:normAutofit/>
           </a:bodyPr>
           <a:lstStyle/>
           <a:p>
             <a:r>
-              <a:rPr lang="en-US" dirty="0" smtClean="0"/>
+              <a:rPr lang="en-US" sz="3200" dirty="0" smtClean="0"/>
               <a:t>Nutrition Analysis by Jackie Batson</a:t>
             </a:r>
+            <a:endParaRPr lang="en-US" sz="3200" dirty="0"/>
+          </a:p>
+        </p:txBody>
+      </p:sp>
+      <p:sp>
+        <p:nvSpPr>
+          <p:cNvPr id="3" name="Content Placeholder 2"/>
+          <p:cNvSpPr>
+            <a:spLocks noGrp="1"/>
+          </p:cNvSpPr>
+          <p:nvPr>
+            <p:ph idx="1"/>
+          </p:nvPr>
+        </p:nvSpPr>
+        <p:spPr>
+          <a:xfrm>
+            <a:off x="457200" y="1295400"/>
+            <a:ext cx="7467600" cy="4830763"/>
+          </a:xfrm>
+        </p:spPr>
+        <p:txBody>
+          <a:bodyPr/>
+          <a:lstStyle/>
+          <a:p>
+            <a:pPr>
+              <a:buNone/>
+            </a:pPr>
+            <a:r>
+              <a:rPr lang="en-US" sz="1600" dirty="0" smtClean="0"/>
+              <a:t>This analysis begins after the user’s image has been identified by the </a:t>
+            </a:r>
+            <a:r>
+              <a:rPr lang="en-US" sz="1600" dirty="0" err="1" smtClean="0"/>
+              <a:t>TensorFlow</a:t>
+            </a:r>
+            <a:r>
+              <a:rPr lang="en-US" sz="1600" dirty="0" smtClean="0"/>
+              <a:t> model.  It assumes that we have a string name for the food, e.g. “cheeseburger”, from the model.  I subbed in example strings before image classification was done.  Here are some examples:</a:t>
+            </a:r>
+          </a:p>
+          <a:p>
+            <a:pPr>
+              <a:buNone/>
+            </a:pPr>
+            <a:endParaRPr lang="en-US" sz="1800" dirty="0" smtClean="0"/>
+          </a:p>
+          <a:p>
+            <a:pPr>
+              <a:buNone/>
+            </a:pPr>
+            <a:endParaRPr lang="en-US" sz="1800" dirty="0" smtClean="0"/>
+          </a:p>
+          <a:p>
+            <a:pPr>
+              <a:buNone/>
+            </a:pPr>
             <a:endParaRPr lang="en-US" dirty="0"/>
           </a:p>
         </p:txBody>
       </p:sp>
-      <p:sp>
-        <p:nvSpPr>
-          <p:cNvPr id="3" name="Content Placeholder 2"/>
-          <p:cNvSpPr>
-            <a:spLocks noGrp="1"/>
-          </p:cNvSpPr>
-          <p:nvPr>
-            <p:ph idx="1"/>
-          </p:nvPr>
-        </p:nvSpPr>
-        <p:spPr/>
-        <p:txBody>
-          <a:bodyPr/>
-          <a:lstStyle/>
-          <a:p>
-            <a:endParaRPr lang="en-US"/>
+      <p:pic>
+        <p:nvPicPr>
+          <p:cNvPr id="5" name="Picture 4" descr="nutritionResultsApple.png"/>
+          <p:cNvPicPr>
+            <a:picLocks noChangeAspect="1"/>
+          </p:cNvPicPr>
+          <p:nvPr/>
+        </p:nvPicPr>
+        <p:blipFill>
+          <a:blip r:embed="rId2" cstate="print"/>
+          <a:stretch>
+            <a:fillRect/>
+          </a:stretch>
+        </p:blipFill>
+        <p:spPr>
+          <a:xfrm>
+            <a:off x="304800" y="2743200"/>
+            <a:ext cx="2571750" cy="4114800"/>
+          </a:xfrm>
+          <a:prstGeom prst="rect">
+            <a:avLst/>
+          </a:prstGeom>
+        </p:spPr>
+      </p:pic>
+      <p:pic>
+        <p:nvPicPr>
+          <p:cNvPr id="6" name="Picture 5" descr="nutritionResultsDoughnut.png"/>
+          <p:cNvPicPr>
+            <a:picLocks noChangeAspect="1"/>
+          </p:cNvPicPr>
+          <p:nvPr/>
+        </p:nvPicPr>
+        <p:blipFill>
+          <a:blip r:embed="rId3" cstate="print"/>
+          <a:stretch>
+            <a:fillRect/>
+          </a:stretch>
+        </p:blipFill>
+        <p:spPr>
+          <a:xfrm>
+            <a:off x="6248400" y="2697480"/>
+            <a:ext cx="2600325" cy="4160520"/>
+          </a:xfrm>
+          <a:prstGeom prst="rect">
+            <a:avLst/>
+          </a:prstGeom>
+        </p:spPr>
+      </p:pic>
+      <p:sp>
+        <p:nvSpPr>
+          <p:cNvPr id="7" name="TextBox 6"/>
+          <p:cNvSpPr txBox="1"/>
+          <p:nvPr/>
+        </p:nvSpPr>
+        <p:spPr>
+          <a:xfrm>
+            <a:off x="2971800" y="2362201"/>
+            <a:ext cx="3124200" cy="4419600"/>
+          </a:xfrm>
+          <a:prstGeom prst="rect">
+            <a:avLst/>
+          </a:prstGeom>
+          <a:noFill/>
+        </p:spPr>
+        <p:txBody>
+          <a:bodyPr wrap="square" rtlCol="0">
+            <a:spAutoFit/>
+          </a:bodyPr>
+          <a:lstStyle/>
+          <a:p>
+            <a:r>
+              <a:rPr lang="en-US" sz="1400" dirty="0" smtClean="0"/>
+              <a:t>On the left, the input from the food classification output is “apple”, shown at the top.  A nutritional breakdown, including calories, is then shown, powered by the </a:t>
+            </a:r>
+            <a:r>
+              <a:rPr lang="en-US" sz="1400" dirty="0" err="1" smtClean="0"/>
+              <a:t>Nutritionix</a:t>
+            </a:r>
+            <a:r>
+              <a:rPr lang="en-US" sz="1400" dirty="0" smtClean="0"/>
+              <a:t> API.  I then analyzed the nutritional results, anything less than 5% daily value is low and greater than 20% </a:t>
+            </a:r>
+            <a:r>
+              <a:rPr lang="en-US" sz="1400" dirty="0" err="1" smtClean="0"/>
+              <a:t>dv</a:t>
+            </a:r>
+            <a:r>
+              <a:rPr lang="en-US" sz="1400" dirty="0" smtClean="0"/>
+              <a:t> is high.  Healthy foods are high in vitamins, calcium, and fiber and low in saturated fats, cholesterol, and sodium.  I decided that if a food had at least two healthy traits and more healthy than unhealthy traits, it is a healthy food.  If it has two or more unhealthy traits and more unhealthy than healthy traits, it is a junk food.  Otherwise, it is a neutral food.  On the right, we see the same results for “doughnut”.</a:t>
+            </a:r>
+            <a:endParaRPr lang="en-US" sz="1400" dirty="0"/>
           </a:p>
         </p:txBody>
       </p:sp>

</xml_diff>